<commit_message>
alterações nos conjuntos de dados e correções no artigo e slides
</commit_message>
<xml_diff>
--- a/documentos/Slides - ApresentaçãoFinal - TCC3 - RenanPupin.pptx
+++ b/documentos/Slides - ApresentaçãoFinal - TCC3 - RenanPupin.pptx
@@ -213,7 +213,7 @@
           <a:p>
             <a:fld id="{80A7EC45-FD83-423D-8A7A-C4C2DDB87A70}" type="datetimeFigureOut">
               <a:rPr lang="pt-BR" smtClean="0"/>
-              <a:t>30/06/2016</a:t>
+              <a:t>01/07/2016</a:t>
             </a:fld>
             <a:endParaRPr lang="pt-BR"/>
           </a:p>
@@ -780,7 +780,7 @@
           <a:p>
             <a:fld id="{076A08A8-9D33-4FF4-A8E4-7C642F964516}" type="datetime1">
               <a:rPr lang="pt-BR" smtClean="0"/>
-              <a:t>30/06/2016</a:t>
+              <a:t>01/07/2016</a:t>
             </a:fld>
             <a:endParaRPr lang="pt-BR"/>
           </a:p>
@@ -950,7 +950,7 @@
           <a:p>
             <a:fld id="{05D69F35-814B-4699-A555-0B86429E8335}" type="datetime1">
               <a:rPr lang="pt-BR" smtClean="0"/>
-              <a:t>30/06/2016</a:t>
+              <a:t>01/07/2016</a:t>
             </a:fld>
             <a:endParaRPr lang="pt-BR"/>
           </a:p>
@@ -1130,7 +1130,7 @@
           <a:p>
             <a:fld id="{C1A21F1B-3CA6-4345-9E67-DE788FE84C21}" type="datetime1">
               <a:rPr lang="pt-BR" smtClean="0"/>
-              <a:t>30/06/2016</a:t>
+              <a:t>01/07/2016</a:t>
             </a:fld>
             <a:endParaRPr lang="pt-BR"/>
           </a:p>
@@ -1300,7 +1300,7 @@
           <a:p>
             <a:fld id="{11FFB333-7D04-4E4C-BC6F-9CA3998AB752}" type="datetime1">
               <a:rPr lang="pt-BR" smtClean="0"/>
-              <a:t>30/06/2016</a:t>
+              <a:t>01/07/2016</a:t>
             </a:fld>
             <a:endParaRPr lang="pt-BR"/>
           </a:p>
@@ -1546,7 +1546,7 @@
           <a:p>
             <a:fld id="{CAD27D16-A9BE-420C-B5BA-B7376CE9A33A}" type="datetime1">
               <a:rPr lang="pt-BR" smtClean="0"/>
-              <a:t>30/06/2016</a:t>
+              <a:t>01/07/2016</a:t>
             </a:fld>
             <a:endParaRPr lang="pt-BR"/>
           </a:p>
@@ -1778,7 +1778,7 @@
           <a:p>
             <a:fld id="{804D626B-D1EC-4673-93B9-70AEFF7DEB30}" type="datetime1">
               <a:rPr lang="pt-BR" smtClean="0"/>
-              <a:t>30/06/2016</a:t>
+              <a:t>01/07/2016</a:t>
             </a:fld>
             <a:endParaRPr lang="pt-BR"/>
           </a:p>
@@ -2145,7 +2145,7 @@
           <a:p>
             <a:fld id="{8DB7A426-89BB-46C4-A7A1-B610BA6A044F}" type="datetime1">
               <a:rPr lang="pt-BR" smtClean="0"/>
-              <a:t>30/06/2016</a:t>
+              <a:t>01/07/2016</a:t>
             </a:fld>
             <a:endParaRPr lang="pt-BR"/>
           </a:p>
@@ -2263,7 +2263,7 @@
           <a:p>
             <a:fld id="{063C5137-617F-4515-9DD6-747B5A522224}" type="datetime1">
               <a:rPr lang="pt-BR" smtClean="0"/>
-              <a:t>30/06/2016</a:t>
+              <a:t>01/07/2016</a:t>
             </a:fld>
             <a:endParaRPr lang="pt-BR"/>
           </a:p>
@@ -2358,7 +2358,7 @@
           <a:p>
             <a:fld id="{95ED1DC8-3F34-46E4-A8B3-DE864422A3EC}" type="datetime1">
               <a:rPr lang="pt-BR" smtClean="0"/>
-              <a:t>30/06/2016</a:t>
+              <a:t>01/07/2016</a:t>
             </a:fld>
             <a:endParaRPr lang="pt-BR"/>
           </a:p>
@@ -2635,7 +2635,7 @@
           <a:p>
             <a:fld id="{F681F27B-EC5A-4D23-A2E9-10F6B1BA5C10}" type="datetime1">
               <a:rPr lang="pt-BR" smtClean="0"/>
-              <a:t>30/06/2016</a:t>
+              <a:t>01/07/2016</a:t>
             </a:fld>
             <a:endParaRPr lang="pt-BR"/>
           </a:p>
@@ -2888,7 +2888,7 @@
           <a:p>
             <a:fld id="{C9788A92-8A3A-4D0B-B95D-50B8B2BD54FA}" type="datetime1">
               <a:rPr lang="pt-BR" smtClean="0"/>
-              <a:t>30/06/2016</a:t>
+              <a:t>01/07/2016</a:t>
             </a:fld>
             <a:endParaRPr lang="pt-BR"/>
           </a:p>
@@ -3101,7 +3101,7 @@
           <a:p>
             <a:fld id="{FEE2625D-2D59-48F2-A4AA-C05A4A7E18D3}" type="datetime1">
               <a:rPr lang="pt-BR" smtClean="0"/>
-              <a:t>30/06/2016</a:t>
+              <a:t>01/07/2016</a:t>
             </a:fld>
             <a:endParaRPr lang="pt-BR"/>
           </a:p>
@@ -3987,36 +3987,93 @@
         <p:spPr/>
         <p:txBody>
           <a:bodyPr>
-            <a:normAutofit lnSpcReduction="10000"/>
+            <a:normAutofit fontScale="92500"/>
           </a:bodyPr>
           <a:lstStyle/>
           <a:p>
             <a:r>
               <a:rPr lang="pt-BR" dirty="0" smtClean="0"/>
-              <a:t>A ferramenta facilita significativamente o estudo aprofundado sobre os dados </a:t>
-            </a:r>
+              <a:t>A ferramenta facilita significativamente o estudo </a:t>
+            </a:r>
+            <a:r>
+              <a:rPr lang="pt-BR" dirty="0" smtClean="0"/>
+              <a:t>sobre </a:t>
+            </a:r>
+            <a:r>
+              <a:rPr lang="pt-BR" dirty="0" smtClean="0"/>
+              <a:t>os </a:t>
+            </a:r>
+            <a:r>
+              <a:rPr lang="pt-BR" dirty="0" smtClean="0"/>
+              <a:t>dados, pois</a:t>
+            </a:r>
+            <a:endParaRPr lang="pt-BR" dirty="0" smtClean="0"/>
           </a:p>
           <a:p>
             <a:pPr lvl="1"/>
             <a:r>
               <a:rPr lang="pt-BR" dirty="0" smtClean="0"/>
-              <a:t>Fornece uma análise intuitiva para converter grande quantidade de informações em conhecimentos</a:t>
+              <a:t>Fornece uma </a:t>
+            </a:r>
+            <a:r>
+              <a:rPr lang="pt-BR" b="1" dirty="0" smtClean="0"/>
+              <a:t>análise intuitiva</a:t>
+            </a:r>
+            <a:r>
+              <a:rPr lang="pt-BR" dirty="0" smtClean="0"/>
+              <a:t> para converter </a:t>
+            </a:r>
+            <a:r>
+              <a:rPr lang="pt-BR" dirty="0" smtClean="0"/>
+              <a:t>grandes quantidades </a:t>
+            </a:r>
+            <a:r>
+              <a:rPr lang="pt-BR" dirty="0" smtClean="0"/>
+              <a:t>de informações em conhecimentos</a:t>
             </a:r>
           </a:p>
           <a:p>
             <a:pPr lvl="1"/>
             <a:r>
               <a:rPr lang="pt-BR" dirty="0" smtClean="0"/>
-              <a:t>Permite que o usuário interaja com os dados adicionando visualizações</a:t>
-            </a:r>
-          </a:p>
-          <a:p>
+              <a:t>Permite que o </a:t>
+            </a:r>
+            <a:r>
+              <a:rPr lang="pt-BR" b="1" dirty="0" smtClean="0"/>
+              <a:t>usuário interaja com os dados </a:t>
+            </a:r>
+            <a:r>
+              <a:rPr lang="pt-BR" dirty="0" smtClean="0"/>
+              <a:t>adicionando </a:t>
+            </a:r>
+            <a:r>
+              <a:rPr lang="pt-BR" dirty="0" smtClean="0"/>
+              <a:t>visualizações</a:t>
+            </a:r>
+          </a:p>
+          <a:p>
+            <a:pPr lvl="1"/>
+            <a:r>
+              <a:rPr lang="pt-BR" dirty="0" smtClean="0"/>
+              <a:t>Possibilita que o usuário aplique</a:t>
+            </a:r>
+            <a:r>
+              <a:rPr lang="pt-BR" b="1" dirty="0" smtClean="0"/>
+              <a:t> regras de condição para filtrar</a:t>
+            </a:r>
+            <a:r>
+              <a:rPr lang="pt-BR" dirty="0" smtClean="0"/>
+              <a:t> instâncias de dados</a:t>
+            </a:r>
             <a:endParaRPr lang="pt-BR" dirty="0" smtClean="0"/>
           </a:p>
           <a:p>
-            <a:r>
-              <a:rPr lang="pt-BR" dirty="0" smtClean="0"/>
-              <a:t>As facilidades </a:t>
+            <a:endParaRPr lang="pt-BR" dirty="0" smtClean="0"/>
+          </a:p>
+          <a:p>
+            <a:r>
+              <a:rPr lang="pt-BR" dirty="0" smtClean="0"/>
+              <a:t>Estas capacidades são permitidas pelos recursos da ferramenta</a:t>
             </a:r>
             <a:endParaRPr lang="pt-BR" dirty="0"/>
           </a:p>
@@ -4145,49 +4202,109 @@
         <p:spPr/>
         <p:txBody>
           <a:bodyPr>
-            <a:normAutofit fontScale="92500" lnSpcReduction="10000"/>
+            <a:normAutofit/>
           </a:bodyPr>
           <a:lstStyle/>
           <a:p>
             <a:r>
               <a:rPr lang="pt-BR" dirty="0" smtClean="0"/>
-              <a:t>Melhoria na performance e na qualidade do código existente</a:t>
-            </a:r>
-          </a:p>
-          <a:p>
+              <a:t>A ferramenta já apresenta uma melhoria na capacidade de entendimento e interação sobre os dados brutos.</a:t>
+            </a:r>
+          </a:p>
+          <a:p>
+            <a:endParaRPr lang="pt-BR" dirty="0"/>
+          </a:p>
+          <a:p>
+            <a:r>
+              <a:rPr lang="pt-BR" dirty="0" smtClean="0"/>
+              <a:t>Porém há várias possíveis mudanças que podem ser implementadas</a:t>
+            </a:r>
+          </a:p>
+          <a:p>
+            <a:pPr lvl="1"/>
+            <a:r>
+              <a:rPr lang="pt-BR" dirty="0" smtClean="0"/>
+              <a:t>Melhoria </a:t>
+            </a:r>
+            <a:r>
+              <a:rPr lang="pt-BR" dirty="0" smtClean="0"/>
+              <a:t>na </a:t>
+            </a:r>
+            <a:r>
+              <a:rPr lang="pt-BR" b="1" dirty="0" smtClean="0"/>
+              <a:t>performance e na qualidade do código </a:t>
+            </a:r>
+            <a:r>
+              <a:rPr lang="pt-BR" dirty="0" smtClean="0"/>
+              <a:t>existente</a:t>
+            </a:r>
             <a:endParaRPr lang="pt-BR" dirty="0" smtClean="0"/>
           </a:p>
           <a:p>
-            <a:r>
-              <a:rPr lang="pt-BR" dirty="0" smtClean="0"/>
-              <a:t>Adicionar funcionalidade de busca</a:t>
-            </a:r>
-          </a:p>
-          <a:p>
+            <a:pPr lvl="1"/>
+            <a:r>
+              <a:rPr lang="pt-BR" dirty="0" smtClean="0"/>
+              <a:t>Adicionar </a:t>
+            </a:r>
+            <a:r>
+              <a:rPr lang="pt-BR" b="1" dirty="0" smtClean="0"/>
+              <a:t>funcionalidade de </a:t>
+            </a:r>
+            <a:r>
+              <a:rPr lang="pt-BR" b="1" dirty="0" smtClean="0"/>
+              <a:t>busca </a:t>
+            </a:r>
+            <a:r>
+              <a:rPr lang="pt-BR" dirty="0" smtClean="0"/>
+              <a:t>reativa</a:t>
+            </a:r>
             <a:endParaRPr lang="pt-BR" dirty="0" smtClean="0"/>
           </a:p>
           <a:p>
-            <a:r>
-              <a:rPr lang="pt-BR" dirty="0" smtClean="0"/>
-              <a:t>Melhorias de usabilidade da interface</a:t>
-            </a:r>
-          </a:p>
-          <a:p>
+            <a:pPr lvl="1"/>
+            <a:r>
+              <a:rPr lang="pt-BR" dirty="0" smtClean="0"/>
+              <a:t>Melhorias de </a:t>
+            </a:r>
+            <a:r>
+              <a:rPr lang="pt-BR" b="1" dirty="0" smtClean="0"/>
+              <a:t>usabilidade da </a:t>
+            </a:r>
+            <a:r>
+              <a:rPr lang="pt-BR" b="1" dirty="0" smtClean="0"/>
+              <a:t>interface</a:t>
+            </a:r>
+            <a:endParaRPr lang="pt-BR" b="1" dirty="0" smtClean="0"/>
+          </a:p>
+          <a:p>
+            <a:pPr lvl="1"/>
+            <a:r>
+              <a:rPr lang="pt-BR" dirty="0" smtClean="0"/>
+              <a:t>Criar uma </a:t>
+            </a:r>
+            <a:r>
+              <a:rPr lang="pt-BR" b="1" dirty="0" smtClean="0"/>
+              <a:t>versão responsiva </a:t>
+            </a:r>
+            <a:r>
+              <a:rPr lang="pt-BR" dirty="0" smtClean="0"/>
+              <a:t>para dispositivos </a:t>
+            </a:r>
+            <a:r>
+              <a:rPr lang="pt-BR" dirty="0" smtClean="0"/>
+              <a:t>móveis</a:t>
+            </a:r>
             <a:endParaRPr lang="pt-BR" dirty="0" smtClean="0"/>
           </a:p>
           <a:p>
-            <a:r>
-              <a:rPr lang="pt-BR" dirty="0" smtClean="0"/>
-              <a:t>Criar uma versão responsiva para dispositivos móveis</a:t>
-            </a:r>
-          </a:p>
-          <a:p>
-            <a:endParaRPr lang="pt-BR" dirty="0" smtClean="0"/>
-          </a:p>
-          <a:p>
-            <a:r>
-              <a:rPr lang="pt-BR" dirty="0" smtClean="0"/>
-              <a:t>Criar uma documentação para facilitar aos usuários contribuir com a ferramenta implementando novas visualizações </a:t>
+            <a:pPr lvl="1"/>
+            <a:r>
+              <a:rPr lang="pt-BR" b="1" dirty="0" smtClean="0"/>
+              <a:t>Criar uma documentação</a:t>
+            </a:r>
+            <a:r>
+              <a:rPr lang="pt-BR" dirty="0" smtClean="0"/>
+              <a:t> para facilitar aos usuários contribuir com a ferramenta implementando novas visualizações </a:t>
             </a:r>
           </a:p>
           <a:p>
@@ -4736,7 +4853,6 @@
               <a:rPr lang="pt-BR" sz="2000" dirty="0"/>
               <a:t>Disponível em: http://www.ipece.ce.gov.br/publicacoes/textos_discussao/TD_78.pdf</a:t>
             </a:r>
-            <a:endParaRPr lang="pt-BR" sz="2000" dirty="0"/>
           </a:p>
         </p:txBody>
       </p:sp>
@@ -5073,7 +5189,6 @@
               <a:rPr lang="pt-BR" dirty="0" smtClean="0"/>
               <a:t>Explorer</a:t>
             </a:r>
-            <a:endParaRPr lang="pt-BR" dirty="0" smtClean="0"/>
           </a:p>
           <a:p>
             <a:pPr marL="514350" indent="-514350">
@@ -5219,14 +5334,17 @@
               <a:rPr lang="pt-BR" dirty="0" smtClean="0">
                 <a:latin typeface="+mj-lt"/>
               </a:rPr>
-              <a:t>Aplicações disponibilizam </a:t>
+              <a:t>Diante de </a:t>
             </a:r>
             <a:r>
               <a:rPr lang="pt-BR" b="1" dirty="0" smtClean="0">
                 <a:latin typeface="+mj-lt"/>
               </a:rPr>
-              <a:t>grande volume de dados</a:t>
-            </a:r>
+              <a:t>grandes volume de dados</a:t>
+            </a:r>
+            <a:endParaRPr lang="pt-BR" b="1" dirty="0" smtClean="0">
+              <a:latin typeface="+mj-lt"/>
+            </a:endParaRPr>
           </a:p>
           <a:p>
             <a:pPr lvl="1"/>
@@ -5234,13 +5352,25 @@
               <a:rPr lang="pt-BR" dirty="0" smtClean="0">
                 <a:latin typeface="+mj-lt"/>
               </a:rPr>
-              <a:t>Análise de grande volume de dados </a:t>
+              <a:t>Análise </a:t>
             </a:r>
             <a:r>
               <a:rPr lang="pt-BR" dirty="0" smtClean="0">
                 <a:latin typeface="+mj-lt"/>
               </a:rPr>
-              <a:t>requerem</a:t>
+              <a:t>e estudo destes dados </a:t>
+            </a:r>
+            <a:r>
+              <a:rPr lang="pt-BR" dirty="0" smtClean="0">
+                <a:latin typeface="+mj-lt"/>
+              </a:rPr>
+              <a:t>requerem </a:t>
+            </a:r>
+            <a:r>
+              <a:rPr lang="pt-BR" b="1" dirty="0" smtClean="0">
+                <a:latin typeface="+mj-lt"/>
+              </a:rPr>
+              <a:t>muito</a:t>
             </a:r>
             <a:r>
               <a:rPr lang="pt-BR" dirty="0" smtClean="0">
@@ -5252,7 +5382,57 @@
               <a:rPr lang="pt-BR" b="1" dirty="0" smtClean="0">
                 <a:latin typeface="+mj-lt"/>
               </a:rPr>
-              <a:t>muito</a:t>
+              <a:t>trabalho,</a:t>
+            </a:r>
+            <a:r>
+              <a:rPr lang="pt-BR" dirty="0" smtClean="0">
+                <a:latin typeface="+mj-lt"/>
+              </a:rPr>
+              <a:t> o que gera ineficiência no estudo</a:t>
+            </a:r>
+            <a:endParaRPr lang="pt-BR" dirty="0">
+              <a:latin typeface="+mj-lt"/>
+            </a:endParaRPr>
+          </a:p>
+          <a:p>
+            <a:pPr lvl="1"/>
+            <a:endParaRPr lang="pt-BR" dirty="0" smtClean="0">
+              <a:latin typeface="+mj-lt"/>
+            </a:endParaRPr>
+          </a:p>
+          <a:p>
+            <a:r>
+              <a:rPr lang="pt-BR" dirty="0" smtClean="0">
+                <a:latin typeface="+mj-lt"/>
+              </a:rPr>
+              <a:t>Surgimento de </a:t>
+            </a:r>
+            <a:r>
+              <a:rPr lang="pt-BR" b="1" dirty="0" smtClean="0">
+                <a:latin typeface="+mj-lt"/>
+              </a:rPr>
+              <a:t>técnicas de visualização</a:t>
+            </a:r>
+          </a:p>
+          <a:p>
+            <a:pPr lvl="1"/>
+            <a:r>
+              <a:rPr lang="pt-BR" b="1" dirty="0" smtClean="0">
+                <a:latin typeface="+mj-lt"/>
+              </a:rPr>
+              <a:t>Melhora</a:t>
+            </a:r>
+            <a:r>
+              <a:rPr lang="pt-BR" dirty="0" smtClean="0">
+                <a:latin typeface="+mj-lt"/>
+              </a:rPr>
+              <a:t> na facilidade de </a:t>
+            </a:r>
+            <a:r>
+              <a:rPr lang="pt-BR" b="1" dirty="0" smtClean="0">
+                <a:latin typeface="+mj-lt"/>
+              </a:rPr>
+              <a:t>entendimento e exploração</a:t>
             </a:r>
             <a:r>
               <a:rPr lang="pt-BR" dirty="0" smtClean="0">
@@ -5261,79 +5441,38 @@
               <a:t> </a:t>
             </a:r>
             <a:r>
-              <a:rPr lang="pt-BR" b="1" dirty="0" smtClean="0">
-                <a:latin typeface="+mj-lt"/>
-              </a:rPr>
-              <a:t>trabalho</a:t>
-            </a:r>
-            <a:r>
               <a:rPr lang="pt-BR" dirty="0" smtClean="0">
                 <a:latin typeface="+mj-lt"/>
               </a:rPr>
-              <a:t> (ineficiência de estudo)</a:t>
-            </a:r>
+              <a:t>dos dados</a:t>
+            </a:r>
+          </a:p>
+          <a:p>
             <a:endParaRPr lang="pt-BR" dirty="0">
               <a:latin typeface="+mj-lt"/>
             </a:endParaRPr>
           </a:p>
           <a:p>
-            <a:pPr lvl="1"/>
-            <a:endParaRPr lang="pt-BR" dirty="0" smtClean="0">
-              <a:latin typeface="+mj-lt"/>
-            </a:endParaRPr>
-          </a:p>
-          <a:p>
             <a:r>
               <a:rPr lang="pt-BR" dirty="0" smtClean="0">
                 <a:latin typeface="+mj-lt"/>
               </a:rPr>
-              <a:t>Surgimento de </a:t>
-            </a:r>
-            <a:r>
-              <a:rPr lang="pt-BR" b="1" dirty="0" smtClean="0">
-                <a:latin typeface="+mj-lt"/>
-              </a:rPr>
-              <a:t>técnicas de visualização</a:t>
+              <a:t>Ideia</a:t>
             </a:r>
           </a:p>
           <a:p>
             <a:pPr lvl="1"/>
-            <a:r>
-              <a:rPr lang="pt-BR" b="1" dirty="0" smtClean="0">
-                <a:latin typeface="+mj-lt"/>
-              </a:rPr>
-              <a:t>Melhora</a:t>
-            </a:r>
             <a:r>
               <a:rPr lang="pt-BR" dirty="0" smtClean="0">
                 <a:latin typeface="+mj-lt"/>
               </a:rPr>
-              <a:t> na facilidade de </a:t>
-            </a:r>
-            <a:r>
-              <a:rPr lang="pt-BR" b="1" dirty="0" smtClean="0">
-                <a:latin typeface="+mj-lt"/>
-              </a:rPr>
-              <a:t>entendimento</a:t>
+              <a:t>Desenvolver </a:t>
             </a:r>
             <a:r>
               <a:rPr lang="pt-BR" dirty="0" smtClean="0">
                 <a:latin typeface="+mj-lt"/>
               </a:rPr>
-              <a:t> dos dados</a:t>
-            </a:r>
-          </a:p>
-          <a:p>
-            <a:endParaRPr lang="pt-BR" dirty="0">
-              <a:latin typeface="+mj-lt"/>
-            </a:endParaRPr>
-          </a:p>
-          <a:p>
-            <a:r>
-              <a:rPr lang="pt-BR" dirty="0" smtClean="0">
-                <a:latin typeface="+mj-lt"/>
-              </a:rPr>
-              <a:t>Desenvolvimento de uma </a:t>
+              <a:t>uma </a:t>
             </a:r>
             <a:r>
               <a:rPr lang="pt-BR" b="1" dirty="0" smtClean="0">
@@ -5351,17 +5490,8 @@
               <a:rPr lang="pt-BR" b="1" dirty="0" smtClean="0">
                 <a:latin typeface="+mj-lt"/>
               </a:rPr>
-              <a:t>exploração de grandes conjuntos de </a:t>
-            </a:r>
-            <a:r>
-              <a:rPr lang="pt-BR" b="1" dirty="0" smtClean="0">
-                <a:latin typeface="+mj-lt"/>
-              </a:rPr>
-              <a:t>dados em um ambiente georreferenciado</a:t>
-            </a:r>
-            <a:endParaRPr lang="pt-BR" b="1" dirty="0" smtClean="0">
-              <a:latin typeface="+mj-lt"/>
-            </a:endParaRPr>
+              <a:t>exploração de grandes conjuntos de dados em um ambiente georreferenciado</a:t>
+            </a:r>
           </a:p>
           <a:p>
             <a:endParaRPr lang="pt-BR" dirty="0" smtClean="0">
@@ -5498,9 +5628,6 @@
               </a:rPr>
               <a:t>através de </a:t>
             </a:r>
-            <a:endParaRPr lang="pt-BR" dirty="0" smtClean="0">
-              <a:latin typeface="+mj-lt"/>
-            </a:endParaRPr>
           </a:p>
           <a:p>
             <a:pPr marL="0" indent="0">
@@ -5510,13 +5637,7 @@
               <a:rPr lang="pt-BR" dirty="0" smtClean="0">
                 <a:latin typeface="+mj-lt"/>
               </a:rPr>
-              <a:t>representações </a:t>
-            </a:r>
-            <a:r>
-              <a:rPr lang="pt-BR" dirty="0" smtClean="0">
-                <a:latin typeface="+mj-lt"/>
-              </a:rPr>
-              <a:t>visuais</a:t>
+              <a:t>representações visuais</a:t>
             </a:r>
           </a:p>
           <a:p>
@@ -5555,9 +5676,6 @@
               </a:rPr>
               <a:t> </a:t>
             </a:r>
-            <a:endParaRPr lang="pt-BR" dirty="0" smtClean="0">
-              <a:latin typeface="+mj-lt"/>
-            </a:endParaRPr>
           </a:p>
           <a:p>
             <a:pPr marL="0" indent="0">
@@ -5567,13 +5685,7 @@
               <a:rPr lang="pt-BR" dirty="0" smtClean="0">
                 <a:latin typeface="+mj-lt"/>
               </a:rPr>
-              <a:t>em </a:t>
-            </a:r>
-            <a:r>
-              <a:rPr lang="pt-BR" dirty="0" smtClean="0">
-                <a:latin typeface="+mj-lt"/>
-              </a:rPr>
-              <a:t>um ambiente georreferenciado sobre os dados</a:t>
+              <a:t>em um ambiente georreferenciado sobre os dados</a:t>
             </a:r>
           </a:p>
           <a:p>
@@ -5611,8 +5723,17 @@
               <a:rPr lang="pt-BR" dirty="0" smtClean="0">
                 <a:latin typeface="+mj-lt"/>
               </a:rPr>
-              <a:t>E nisso...</a:t>
-            </a:r>
+              <a:t>E </a:t>
+            </a:r>
+            <a:r>
+              <a:rPr lang="pt-BR" dirty="0" smtClean="0">
+                <a:latin typeface="+mj-lt"/>
+              </a:rPr>
+              <a:t>nisso</a:t>
+            </a:r>
+            <a:endParaRPr lang="pt-BR" dirty="0" smtClean="0">
+              <a:latin typeface="+mj-lt"/>
+            </a:endParaRPr>
           </a:p>
           <a:p>
             <a:pPr lvl="1"/>
@@ -5647,19 +5768,7 @@
               <a:rPr lang="pt-BR" dirty="0" smtClean="0">
                 <a:latin typeface="+mj-lt"/>
               </a:rPr>
-              <a:t>Tomada </a:t>
-            </a:r>
-            <a:r>
-              <a:rPr lang="pt-BR" dirty="0" smtClean="0">
-                <a:latin typeface="+mj-lt"/>
-              </a:rPr>
-              <a:t>de decisões </a:t>
-            </a:r>
-            <a:r>
-              <a:rPr lang="pt-BR" dirty="0" smtClean="0">
-                <a:latin typeface="+mj-lt"/>
-              </a:rPr>
-              <a:t>com um maior grau de confiança</a:t>
+              <a:t>Tomada de decisões com um maior grau de confiança</a:t>
             </a:r>
             <a:endParaRPr lang="pt-BR" dirty="0">
               <a:latin typeface="+mj-lt"/>
@@ -5931,8 +6040,8 @@
         </p:nvSpPr>
         <p:spPr>
           <a:xfrm>
-            <a:off x="838200" y="196192"/>
-            <a:ext cx="10515600" cy="1325563"/>
+            <a:off x="319315" y="0"/>
+            <a:ext cx="11495314" cy="1325563"/>
           </a:xfrm>
         </p:spPr>
         <p:txBody>
@@ -6087,11 +6196,7 @@
             </a:r>
             <a:r>
               <a:rPr lang="pt-BR" dirty="0" smtClean="0"/>
-              <a:t> Ex</a:t>
-            </a:r>
-            <a:r>
-              <a:rPr lang="pt-BR" dirty="0" smtClean="0"/>
-              <a:t>plorer</a:t>
+              <a:t> Explorer</a:t>
             </a:r>
             <a:endParaRPr lang="pt-BR" dirty="0"/>
           </a:p>
@@ -6115,21 +6220,18 @@
         </p:spPr>
         <p:txBody>
           <a:bodyPr>
-            <a:normAutofit fontScale="85000" lnSpcReduction="20000"/>
+            <a:normAutofit fontScale="92500" lnSpcReduction="10000"/>
           </a:bodyPr>
           <a:lstStyle/>
           <a:p>
             <a:r>
               <a:rPr lang="pt-BR" b="1" dirty="0" smtClean="0"/>
-              <a:t>Link </a:t>
-            </a:r>
-            <a:r>
-              <a:rPr lang="pt-BR" b="1" dirty="0" smtClean="0"/>
-              <a:t>do projeto</a:t>
+              <a:t>Link do projeto</a:t>
             </a:r>
             <a:endParaRPr lang="pt-BR" dirty="0"/>
           </a:p>
           <a:p>
+            <a:pPr lvl="1"/>
             <a:r>
               <a:rPr lang="pt-BR" dirty="0" smtClean="0"/>
               <a:t> </a:t>
@@ -6158,22 +6260,27 @@
             </a:r>
           </a:p>
           <a:p>
+            <a:pPr lvl="1"/>
             <a:r>
               <a:rPr lang="pt-BR" dirty="0" smtClean="0"/>
               <a:t>HTML</a:t>
             </a:r>
           </a:p>
           <a:p>
+            <a:pPr lvl="1"/>
             <a:r>
               <a:rPr lang="pt-BR" dirty="0" smtClean="0"/>
               <a:t>CSS</a:t>
             </a:r>
-          </a:p>
-          <a:p>
+            <a:endParaRPr lang="pt-BR" dirty="0" smtClean="0"/>
+          </a:p>
+          <a:p>
+            <a:pPr lvl="1"/>
             <a:r>
               <a:rPr lang="pt-BR" dirty="0" smtClean="0"/>
               <a:t>JS</a:t>
             </a:r>
+            <a:endParaRPr lang="pt-BR" dirty="0" smtClean="0"/>
           </a:p>
           <a:p>
             <a:endParaRPr lang="pt-BR" dirty="0"/>
@@ -6185,6 +6292,7 @@
             </a:r>
           </a:p>
           <a:p>
+            <a:pPr lvl="1"/>
             <a:r>
               <a:rPr lang="pt-BR" dirty="0" smtClean="0"/>
               <a:t>Google </a:t>
@@ -6199,6 +6307,7 @@
             </a:r>
           </a:p>
           <a:p>
+            <a:pPr lvl="1"/>
             <a:r>
               <a:rPr lang="pt-BR" dirty="0" smtClean="0"/>
               <a:t>Google </a:t>
@@ -6256,8 +6365,8 @@
         </p:blipFill>
         <p:spPr>
           <a:xfrm>
-            <a:off x="3842657" y="2572769"/>
-            <a:ext cx="8085653" cy="3824514"/>
+            <a:off x="3915228" y="2610459"/>
+            <a:ext cx="7913914" cy="3743281"/>
           </a:xfrm>
           <a:prstGeom prst="rect">
             <a:avLst/>

</xml_diff>